<commit_message>
Atualiza versões e conteúdos
</commit_message>
<xml_diff>
--- a/Conteúdos/Apresentação - Saga.pptx
+++ b/Conteúdos/Apresentação - Saga.pptx
@@ -251,7 +251,7 @@
           <a:p>
             <a:fld id="{1A658991-3A10-4D75-89CC-FE5310122811}" type="datetimeFigureOut">
               <a:rPr lang="pt-BR" smtClean="0"/>
-              <a:t>17/04/2023</a:t>
+              <a:t>21/08/2023</a:t>
             </a:fld>
             <a:endParaRPr lang="pt-BR"/>
           </a:p>
@@ -2009,7 +2009,7 @@
           <a:p>
             <a:fld id="{654E430E-5D4C-4874-960B-D673A28B4FD3}" type="datetimeFigureOut">
               <a:rPr lang="pt-BR" smtClean="0"/>
-              <a:t>17/04/2023</a:t>
+              <a:t>21/08/2023</a:t>
             </a:fld>
             <a:endParaRPr lang="pt-BR"/>
           </a:p>
@@ -2207,7 +2207,7 @@
           <a:p>
             <a:fld id="{654E430E-5D4C-4874-960B-D673A28B4FD3}" type="datetimeFigureOut">
               <a:rPr lang="pt-BR" smtClean="0"/>
-              <a:t>17/04/2023</a:t>
+              <a:t>21/08/2023</a:t>
             </a:fld>
             <a:endParaRPr lang="pt-BR"/>
           </a:p>
@@ -2415,7 +2415,7 @@
           <a:p>
             <a:fld id="{654E430E-5D4C-4874-960B-D673A28B4FD3}" type="datetimeFigureOut">
               <a:rPr lang="pt-BR" smtClean="0"/>
-              <a:t>17/04/2023</a:t>
+              <a:t>21/08/2023</a:t>
             </a:fld>
             <a:endParaRPr lang="pt-BR"/>
           </a:p>
@@ -2613,7 +2613,7 @@
           <a:p>
             <a:fld id="{654E430E-5D4C-4874-960B-D673A28B4FD3}" type="datetimeFigureOut">
               <a:rPr lang="pt-BR" smtClean="0"/>
-              <a:t>17/04/2023</a:t>
+              <a:t>21/08/2023</a:t>
             </a:fld>
             <a:endParaRPr lang="pt-BR"/>
           </a:p>
@@ -2888,7 +2888,7 @@
           <a:p>
             <a:fld id="{654E430E-5D4C-4874-960B-D673A28B4FD3}" type="datetimeFigureOut">
               <a:rPr lang="pt-BR" smtClean="0"/>
-              <a:t>17/04/2023</a:t>
+              <a:t>21/08/2023</a:t>
             </a:fld>
             <a:endParaRPr lang="pt-BR"/>
           </a:p>
@@ -3153,7 +3153,7 @@
           <a:p>
             <a:fld id="{654E430E-5D4C-4874-960B-D673A28B4FD3}" type="datetimeFigureOut">
               <a:rPr lang="pt-BR" smtClean="0"/>
-              <a:t>17/04/2023</a:t>
+              <a:t>21/08/2023</a:t>
             </a:fld>
             <a:endParaRPr lang="pt-BR"/>
           </a:p>
@@ -3565,7 +3565,7 @@
           <a:p>
             <a:fld id="{654E430E-5D4C-4874-960B-D673A28B4FD3}" type="datetimeFigureOut">
               <a:rPr lang="pt-BR" smtClean="0"/>
-              <a:t>17/04/2023</a:t>
+              <a:t>21/08/2023</a:t>
             </a:fld>
             <a:endParaRPr lang="pt-BR"/>
           </a:p>
@@ -3706,7 +3706,7 @@
           <a:p>
             <a:fld id="{654E430E-5D4C-4874-960B-D673A28B4FD3}" type="datetimeFigureOut">
               <a:rPr lang="pt-BR" smtClean="0"/>
-              <a:t>17/04/2023</a:t>
+              <a:t>21/08/2023</a:t>
             </a:fld>
             <a:endParaRPr lang="pt-BR"/>
           </a:p>
@@ -3819,7 +3819,7 @@
           <a:p>
             <a:fld id="{654E430E-5D4C-4874-960B-D673A28B4FD3}" type="datetimeFigureOut">
               <a:rPr lang="pt-BR" smtClean="0"/>
-              <a:t>17/04/2023</a:t>
+              <a:t>21/08/2023</a:t>
             </a:fld>
             <a:endParaRPr lang="pt-BR"/>
           </a:p>
@@ -4130,7 +4130,7 @@
           <a:p>
             <a:fld id="{654E430E-5D4C-4874-960B-D673A28B4FD3}" type="datetimeFigureOut">
               <a:rPr lang="pt-BR" smtClean="0"/>
-              <a:t>17/04/2023</a:t>
+              <a:t>21/08/2023</a:t>
             </a:fld>
             <a:endParaRPr lang="pt-BR"/>
           </a:p>
@@ -4418,7 +4418,7 @@
           <a:p>
             <a:fld id="{654E430E-5D4C-4874-960B-D673A28B4FD3}" type="datetimeFigureOut">
               <a:rPr lang="pt-BR" smtClean="0"/>
-              <a:t>17/04/2023</a:t>
+              <a:t>21/08/2023</a:t>
             </a:fld>
             <a:endParaRPr lang="pt-BR"/>
           </a:p>
@@ -4659,7 +4659,7 @@
           <a:p>
             <a:fld id="{654E430E-5D4C-4874-960B-D673A28B4FD3}" type="datetimeFigureOut">
               <a:rPr lang="pt-BR" smtClean="0"/>
-              <a:t>17/04/2023</a:t>
+              <a:t>21/08/2023</a:t>
             </a:fld>
             <a:endParaRPr lang="pt-BR"/>
           </a:p>
@@ -21962,7 +21962,7 @@
             </a:r>
             <a:r>
               <a:rPr lang="pt-BR" sz="2300" dirty="0"/>
-              <a:t> receberão os eventos de 2 das 4 partições, e o outro </a:t>
+              <a:t> receberão os eventos paralelamente de 2 das 4 partições, e o outro </a:t>
             </a:r>
             <a:r>
               <a:rPr lang="pt-BR" sz="2300" dirty="0" err="1"/>

</xml_diff>

<commit_message>
Ajusta endpoint de busca por evento
</commit_message>
<xml_diff>
--- a/Conteúdos/Apresentação - Saga.pptx
+++ b/Conteúdos/Apresentação - Saga.pptx
@@ -9215,7 +9215,15 @@
             </a:r>
             <a:r>
               <a:rPr lang="pt-BR" dirty="0"/>
-              <a:t>e trabalho com tecnologias Java | Spring e com tecnologias </a:t>
+              <a:t>e trabalho com tecnologias </a:t>
+            </a:r>
+            <a:r>
+              <a:rPr lang="pt-BR" b="1" dirty="0"/>
+              <a:t>Java | Spring </a:t>
+            </a:r>
+            <a:r>
+              <a:rPr lang="pt-BR" dirty="0"/>
+              <a:t>e com tecnologias </a:t>
             </a:r>
             <a:r>
               <a:rPr lang="pt-BR" b="1" dirty="0"/>

</xml_diff>